<commit_message>
Add Beer Juke to presentation
</commit_message>
<xml_diff>
--- a/Making our day job easy.pptx
+++ b/Making our day job easy.pptx
@@ -3417,15 +3417,7 @@
             </a:r>
             <a:r>
               <a:rPr lang="en-US" dirty="0" smtClean="0"/>
-              <a:t> – if set the generated constructor will be private and Lombok will add static method with </a:t>
-            </a:r>
-            <a:r>
-              <a:rPr lang="en-US" dirty="0" smtClean="0"/>
-              <a:t>the same </a:t>
-            </a:r>
-            <a:r>
-              <a:rPr lang="en-US" dirty="0" smtClean="0"/>
-              <a:t>set of parameters that will call the corresponding private constructor</a:t>
+              <a:t> – if set the generated constructor will be private and Lombok will add static method with the same set of parameters that will call the corresponding private constructor</a:t>
             </a:r>
             <a:endParaRPr lang="bg-BG" dirty="0"/>
           </a:p>
@@ -4004,15 +3996,7 @@
             </a:r>
             <a:r>
               <a:rPr lang="en-US" dirty="0" smtClean="0"/>
-              <a:t>– </a:t>
-            </a:r>
-            <a:r>
-              <a:rPr lang="en-US" dirty="0" smtClean="0"/>
-              <a:t>a parameter </a:t>
-            </a:r>
-            <a:r>
-              <a:rPr lang="en-US" dirty="0" smtClean="0"/>
-              <a:t>that tells Lombok to generate static constructor method and constructor for the class to be private. The name of the method is the value of staticConstructor parameter.</a:t>
+              <a:t>– a parameter that tells Lombok to generate static constructor method and constructor for the class to be private. The name of the method is the value of staticConstructor parameter.</a:t>
             </a:r>
             <a:endParaRPr lang="bg-BG" dirty="0"/>
           </a:p>
@@ -5461,15 +5445,7 @@
             </a:r>
             <a:r>
               <a:rPr lang="en-US" dirty="0" smtClean="0"/>
-              <a:t>– </a:t>
-            </a:r>
-            <a:r>
-              <a:rPr lang="en-US" dirty="0" smtClean="0"/>
-              <a:t>a new </a:t>
-            </a:r>
-            <a:r>
-              <a:rPr lang="en-US" dirty="0" smtClean="0"/>
-              <a:t>annotation that is supposed to “help” with initial values </a:t>
+              <a:t>– a new annotation that is supposed to “help” with initial values </a:t>
             </a:r>
           </a:p>
           <a:p>
@@ -6740,6 +6716,30 @@
           </a:p>
         </p:txBody>
       </p:sp>
+      <p:pic>
+        <p:nvPicPr>
+          <p:cNvPr id="4" name="Picture 3" descr="juu.png"/>
+          <p:cNvPicPr>
+            <a:picLocks noChangeAspect="1"/>
+          </p:cNvPicPr>
+          <p:nvPr/>
+        </p:nvPicPr>
+        <p:blipFill>
+          <a:blip r:embed="rId3" cstate="print"/>
+          <a:stretch>
+            <a:fillRect/>
+          </a:stretch>
+        </p:blipFill>
+        <p:spPr>
+          <a:xfrm>
+            <a:off x="7596336" y="3284984"/>
+            <a:ext cx="1298389" cy="1188305"/>
+          </a:xfrm>
+          <a:prstGeom prst="rect">
+            <a:avLst/>
+          </a:prstGeom>
+        </p:spPr>
+      </p:pic>
     </p:spTree>
   </p:cSld>
   <p:clrMapOvr>
@@ -8008,15 +8008,7 @@
             <a:pPr lvl="1"/>
             <a:r>
               <a:rPr lang="en-US" dirty="0" smtClean="0"/>
-              <a:t>Create a fork from </a:t>
-            </a:r>
-            <a:r>
-              <a:rPr lang="en-US" dirty="0" smtClean="0"/>
-              <a:t>Lombok source </a:t>
-            </a:r>
-            <a:r>
-              <a:rPr lang="en-US" dirty="0" smtClean="0"/>
-              <a:t>code on </a:t>
+              <a:t>Create a fork from Lombok source code on </a:t>
             </a:r>
             <a:r>
               <a:rPr lang="en-US" b="1" dirty="0" smtClean="0"/>
@@ -8828,15 +8820,7 @@
             <a:pPr lvl="1"/>
             <a:r>
               <a:rPr lang="en-US" dirty="0" smtClean="0"/>
-              <a:t>Use IDE to generate </a:t>
-            </a:r>
-            <a:r>
-              <a:rPr lang="en-US" dirty="0" smtClean="0"/>
-              <a:t>that </a:t>
-            </a:r>
-            <a:r>
-              <a:rPr lang="en-US" dirty="0" smtClean="0"/>
-              <a:t>code</a:t>
+              <a:t>Use IDE to generate that code</a:t>
             </a:r>
           </a:p>
           <a:p>
@@ -9157,15 +9141,7 @@
             </a:pPr>
             <a:r>
               <a:rPr lang="en-US" dirty="0" smtClean="0"/>
-              <a:t>It is a library that gives us </a:t>
-            </a:r>
-            <a:r>
-              <a:rPr lang="en-US" dirty="0" smtClean="0"/>
-              <a:t>a set </a:t>
-            </a:r>
-            <a:r>
-              <a:rPr lang="en-US" dirty="0" smtClean="0"/>
-              <a:t>of annotations </a:t>
+              <a:t>It is a library that gives us a set of annotations </a:t>
             </a:r>
           </a:p>
           <a:p>
@@ -10035,15 +10011,7 @@
             </a:r>
             <a:r>
               <a:rPr lang="en-US" sz="2400" dirty="0" smtClean="0"/>
-              <a:t> – This parameter indicates that call to the corresponding super method </a:t>
-            </a:r>
-            <a:r>
-              <a:rPr lang="en-US" sz="2400" dirty="0" smtClean="0"/>
-              <a:t>must be </a:t>
-            </a:r>
-            <a:r>
-              <a:rPr lang="en-US" sz="2400" dirty="0" smtClean="0"/>
-              <a:t>included during the evaluation of the corresponding method</a:t>
+              <a:t> – This parameter indicates that call to the corresponding super method must be included during the evaluation of the corresponding method</a:t>
             </a:r>
           </a:p>
           <a:p>
@@ -10084,15 +10052,7 @@
             </a:r>
             <a:r>
               <a:rPr lang="en-US" sz="2400" dirty="0" smtClean="0"/>
-              <a:t> – comma separated list of field names to exclude from </a:t>
-            </a:r>
-            <a:r>
-              <a:rPr lang="en-US" sz="2400" dirty="0" smtClean="0"/>
-              <a:t>the evaluation </a:t>
-            </a:r>
-            <a:r>
-              <a:rPr lang="en-US" sz="2400" dirty="0" smtClean="0"/>
-              <a:t>of </a:t>
+              <a:t> – comma separated list of field names to exclude from the evaluation of </a:t>
             </a:r>
             <a:r>
               <a:rPr lang="en-US" sz="2400" b="1" dirty="0" smtClean="0"/>

</xml_diff>